<commit_message>
my second slide is boring
</commit_message>
<xml_diff>
--- a/CoolPresentation.pptx
+++ b/CoolPresentation.pptx
@@ -6,6 +6,7 @@
   </p:sldMasterIdLst>
   <p:sldIdLst>
     <p:sldId id="256" r:id="rId2"/>
+    <p:sldId id="257" r:id="rId3"/>
   </p:sldIdLst>
   <p:sldSz cx="12192000" cy="6858000"/>
   <p:notesSz cx="6858000" cy="9144000"/>
@@ -104,15 +105,28 @@
       </a:defRPr>
     </a:lvl9pPr>
   </p:defaultTextStyle>
+  <p:extLst>
+    <p:ext uri="{EFAFB233-063F-42B5-8137-9DF3F51BA10A}">
+      <p15:sldGuideLst xmlns:p15="http://schemas.microsoft.com/office/powerpoint/2012/main"/>
+    </p:ext>
+  </p:extLst>
 </p:presentation>
+</file>
+
+<file path=ppt/revisionInfo.xml><?xml version="1.0" encoding="utf-8"?>
+<p1510:revInfo xmlns:a="http://schemas.openxmlformats.org/drawingml/2006/main" xmlns:r="http://schemas.openxmlformats.org/officeDocument/2006/relationships" xmlns:p1510="http://schemas.microsoft.com/office/powerpoint/2015/10/main">
+  <p1510:revLst>
+    <p1510:client id="{01E63D3F-A666-4DD1-A21E-1F407E3DEC96}" v="1" dt="2022-04-06T20:44:38.106"/>
+  </p1510:revLst>
+</p1510:revInfo>
 </file>
 
 <file path=ppt/changesInfos/changesInfo1.xml><?xml version="1.0" encoding="utf-8"?>
 <pc:chgInfo xmlns:a="http://schemas.openxmlformats.org/drawingml/2006/main" xmlns:r="http://schemas.openxmlformats.org/officeDocument/2006/relationships" xmlns:ac="http://schemas.microsoft.com/office/drawing/2013/main/command" xmlns:pc="http://schemas.microsoft.com/office/powerpoint/2013/main/command">
   <pc:docChgLst>
     <pc:chgData name="Holden, Jeremy (NDMNRF)" userId="7172007b-9fa4-4a53-b90c-82cdfcb6f513" providerId="ADAL" clId="{01E63D3F-A666-4DD1-A21E-1F407E3DEC96}"/>
-    <pc:docChg chg="addSld modSld">
-      <pc:chgData name="Holden, Jeremy (NDMNRF)" userId="7172007b-9fa4-4a53-b90c-82cdfcb6f513" providerId="ADAL" clId="{01E63D3F-A666-4DD1-A21E-1F407E3DEC96}" dt="2022-04-06T20:36:53.105" v="20" actId="20577"/>
+    <pc:docChg chg="custSel addSld delSld modSld">
+      <pc:chgData name="Holden, Jeremy (NDMNRF)" userId="7172007b-9fa4-4a53-b90c-82cdfcb6f513" providerId="ADAL" clId="{01E63D3F-A666-4DD1-A21E-1F407E3DEC96}" dt="2022-04-06T20:44:45.571" v="49" actId="20577"/>
       <pc:docMkLst>
         <pc:docMk/>
       </pc:docMkLst>
@@ -136,6 +150,44 @@
             <pc:docMk/>
             <pc:sldMk cId="3753138321" sldId="256"/>
             <ac:spMk id="3" creationId="{99C0786B-B752-46E4-9DC8-3853FD9049CE}"/>
+          </ac:spMkLst>
+        </pc:spChg>
+      </pc:sldChg>
+      <pc:sldChg chg="new del">
+        <pc:chgData name="Holden, Jeremy (NDMNRF)" userId="7172007b-9fa4-4a53-b90c-82cdfcb6f513" providerId="ADAL" clId="{01E63D3F-A666-4DD1-A21E-1F407E3DEC96}" dt="2022-04-06T20:43:23.521" v="22" actId="47"/>
+        <pc:sldMkLst>
+          <pc:docMk/>
+          <pc:sldMk cId="190013254" sldId="257"/>
+        </pc:sldMkLst>
+      </pc:sldChg>
+      <pc:sldChg chg="addSp delSp modSp new mod">
+        <pc:chgData name="Holden, Jeremy (NDMNRF)" userId="7172007b-9fa4-4a53-b90c-82cdfcb6f513" providerId="ADAL" clId="{01E63D3F-A666-4DD1-A21E-1F407E3DEC96}" dt="2022-04-06T20:44:45.571" v="49" actId="20577"/>
+        <pc:sldMkLst>
+          <pc:docMk/>
+          <pc:sldMk cId="3131249615" sldId="257"/>
+        </pc:sldMkLst>
+        <pc:spChg chg="del">
+          <ac:chgData name="Holden, Jeremy (NDMNRF)" userId="7172007b-9fa4-4a53-b90c-82cdfcb6f513" providerId="ADAL" clId="{01E63D3F-A666-4DD1-A21E-1F407E3DEC96}" dt="2022-04-06T20:43:43.625" v="25" actId="478"/>
+          <ac:spMkLst>
+            <pc:docMk/>
+            <pc:sldMk cId="3131249615" sldId="257"/>
+            <ac:spMk id="2" creationId="{F477B301-23F9-478D-A511-1AB666E450CD}"/>
+          </ac:spMkLst>
+        </pc:spChg>
+        <pc:spChg chg="del">
+          <ac:chgData name="Holden, Jeremy (NDMNRF)" userId="7172007b-9fa4-4a53-b90c-82cdfcb6f513" providerId="ADAL" clId="{01E63D3F-A666-4DD1-A21E-1F407E3DEC96}" dt="2022-04-06T20:43:40.698" v="24" actId="478"/>
+          <ac:spMkLst>
+            <pc:docMk/>
+            <pc:sldMk cId="3131249615" sldId="257"/>
+            <ac:spMk id="3" creationId="{ECC6AB84-8AD1-4736-89AA-D58F0D17DF41}"/>
+          </ac:spMkLst>
+        </pc:spChg>
+        <pc:spChg chg="add mod">
+          <ac:chgData name="Holden, Jeremy (NDMNRF)" userId="7172007b-9fa4-4a53-b90c-82cdfcb6f513" providerId="ADAL" clId="{01E63D3F-A666-4DD1-A21E-1F407E3DEC96}" dt="2022-04-06T20:44:45.571" v="49" actId="20577"/>
+          <ac:spMkLst>
+            <pc:docMk/>
+            <pc:sldMk cId="3131249615" sldId="257"/>
+            <ac:spMk id="4" creationId="{1A0D2E28-8DD6-4620-83D5-383E16E0DD7E}"/>
           </ac:spMkLst>
         </pc:spChg>
       </pc:sldChg>
@@ -699,6 +751,72 @@
     <p:extLst>
       <p:ext uri="{BB962C8B-B14F-4D97-AF65-F5344CB8AC3E}">
         <p14:creationId xmlns:p14="http://schemas.microsoft.com/office/powerpoint/2010/main" val="3753138321"/>
+      </p:ext>
+    </p:extLst>
+  </p:cSld>
+  <p:clrMapOvr>
+    <a:masterClrMapping/>
+  </p:clrMapOvr>
+</p:sld>
+</file>
+
+<file path=ppt/slides/slide2.xml><?xml version="1.0" encoding="utf-8"?>
+<p:sld xmlns:a="http://schemas.openxmlformats.org/drawingml/2006/main" xmlns:r="http://schemas.openxmlformats.org/officeDocument/2006/relationships" xmlns:p="http://schemas.openxmlformats.org/presentationml/2006/main">
+  <p:cSld>
+    <p:spTree>
+      <p:nvGrpSpPr>
+        <p:cNvPr id="1" name=""/>
+        <p:cNvGrpSpPr/>
+        <p:nvPr/>
+      </p:nvGrpSpPr>
+      <p:grpSpPr>
+        <a:xfrm>
+          <a:off x="0" y="0"/>
+          <a:ext cx="0" cy="0"/>
+          <a:chOff x="0" y="0"/>
+          <a:chExt cx="0" cy="0"/>
+        </a:xfrm>
+      </p:grpSpPr>
+      <p:sp>
+        <p:nvSpPr>
+          <p:cNvPr id="4" name="TextBox 3">
+            <a:extLst>
+              <a:ext uri="{FF2B5EF4-FFF2-40B4-BE49-F238E27FC236}">
+                <a16:creationId xmlns:a16="http://schemas.microsoft.com/office/drawing/2014/main" id="{1A0D2E28-8DD6-4620-83D5-383E16E0DD7E}"/>
+              </a:ext>
+            </a:extLst>
+          </p:cNvPr>
+          <p:cNvSpPr txBox="1"/>
+          <p:nvPr/>
+        </p:nvSpPr>
+        <p:spPr>
+          <a:xfrm>
+            <a:off x="2263515" y="914400"/>
+            <a:ext cx="8499423" cy="369332"/>
+          </a:xfrm>
+          <a:prstGeom prst="rect">
+            <a:avLst/>
+          </a:prstGeom>
+          <a:noFill/>
+        </p:spPr>
+        <p:txBody>
+          <a:bodyPr wrap="square" rtlCol="0">
+            <a:spAutoFit/>
+          </a:bodyPr>
+          <a:lstStyle/>
+          <a:p>
+            <a:r>
+              <a:rPr lang="en-US" dirty="0"/>
+              <a:t>Slide #2 with some text</a:t>
+            </a:r>
+            <a:endParaRPr lang="en-CA" dirty="0"/>
+          </a:p>
+        </p:txBody>
+      </p:sp>
+    </p:spTree>
+    <p:extLst>
+      <p:ext uri="{BB962C8B-B14F-4D97-AF65-F5344CB8AC3E}">
+        <p14:creationId xmlns:p14="http://schemas.microsoft.com/office/powerpoint/2010/main" val="3131249615"/>
       </p:ext>
     </p:extLst>
   </p:cSld>

</xml_diff>